<commit_message>
Update pypi readme and related figure
</commit_message>
<xml_diff>
--- a/docs/source/figures/Figures.pptx
+++ b/docs/source/figures/Figures.pptx
@@ -207,7 +207,7 @@
           <a:p>
             <a:fld id="{C5A75928-DC98-4F5F-A08B-A6FD3A560A50}" type="datetimeFigureOut">
               <a:rPr lang="en-GB" smtClean="0"/>
-              <a:t>16/02/2020</a:t>
+              <a:t>31/03/2020</a:t>
             </a:fld>
             <a:endParaRPr lang="en-GB"/>
           </a:p>
@@ -519,7 +519,7 @@
           <a:bodyPr/>
           <a:lstStyle/>
           <a:p>
-            <a:endParaRPr lang="en-GB"/>
+            <a:endParaRPr lang="en-GB" dirty="0"/>
           </a:p>
         </p:txBody>
       </p:sp>
@@ -1548,7 +1548,7 @@
           <a:p>
             <a:fld id="{37870B73-9E6A-498D-A14E-F5F68750FD14}" type="datetimeFigureOut">
               <a:rPr lang="en-GB" smtClean="0"/>
-              <a:t>16/02/2020</a:t>
+              <a:t>31/03/2020</a:t>
             </a:fld>
             <a:endParaRPr lang="en-GB"/>
           </a:p>
@@ -1748,7 +1748,7 @@
           <a:p>
             <a:fld id="{37870B73-9E6A-498D-A14E-F5F68750FD14}" type="datetimeFigureOut">
               <a:rPr lang="en-GB" smtClean="0"/>
-              <a:t>16/02/2020</a:t>
+              <a:t>31/03/2020</a:t>
             </a:fld>
             <a:endParaRPr lang="en-GB"/>
           </a:p>
@@ -1958,7 +1958,7 @@
           <a:p>
             <a:fld id="{37870B73-9E6A-498D-A14E-F5F68750FD14}" type="datetimeFigureOut">
               <a:rPr lang="en-GB" smtClean="0"/>
-              <a:t>16/02/2020</a:t>
+              <a:t>31/03/2020</a:t>
             </a:fld>
             <a:endParaRPr lang="en-GB"/>
           </a:p>
@@ -2158,7 +2158,7 @@
           <a:p>
             <a:fld id="{37870B73-9E6A-498D-A14E-F5F68750FD14}" type="datetimeFigureOut">
               <a:rPr lang="en-GB" smtClean="0"/>
-              <a:t>16/02/2020</a:t>
+              <a:t>31/03/2020</a:t>
             </a:fld>
             <a:endParaRPr lang="en-GB"/>
           </a:p>
@@ -2434,7 +2434,7 @@
           <a:p>
             <a:fld id="{37870B73-9E6A-498D-A14E-F5F68750FD14}" type="datetimeFigureOut">
               <a:rPr lang="en-GB" smtClean="0"/>
-              <a:t>16/02/2020</a:t>
+              <a:t>31/03/2020</a:t>
             </a:fld>
             <a:endParaRPr lang="en-GB"/>
           </a:p>
@@ -2702,7 +2702,7 @@
           <a:p>
             <a:fld id="{37870B73-9E6A-498D-A14E-F5F68750FD14}" type="datetimeFigureOut">
               <a:rPr lang="en-GB" smtClean="0"/>
-              <a:t>16/02/2020</a:t>
+              <a:t>31/03/2020</a:t>
             </a:fld>
             <a:endParaRPr lang="en-GB"/>
           </a:p>
@@ -3117,7 +3117,7 @@
           <a:p>
             <a:fld id="{37870B73-9E6A-498D-A14E-F5F68750FD14}" type="datetimeFigureOut">
               <a:rPr lang="en-GB" smtClean="0"/>
-              <a:t>16/02/2020</a:t>
+              <a:t>31/03/2020</a:t>
             </a:fld>
             <a:endParaRPr lang="en-GB"/>
           </a:p>
@@ -3259,7 +3259,7 @@
           <a:p>
             <a:fld id="{37870B73-9E6A-498D-A14E-F5F68750FD14}" type="datetimeFigureOut">
               <a:rPr lang="en-GB" smtClean="0"/>
-              <a:t>16/02/2020</a:t>
+              <a:t>31/03/2020</a:t>
             </a:fld>
             <a:endParaRPr lang="en-GB"/>
           </a:p>
@@ -3372,7 +3372,7 @@
           <a:p>
             <a:fld id="{37870B73-9E6A-498D-A14E-F5F68750FD14}" type="datetimeFigureOut">
               <a:rPr lang="en-GB" smtClean="0"/>
-              <a:t>16/02/2020</a:t>
+              <a:t>31/03/2020</a:t>
             </a:fld>
             <a:endParaRPr lang="en-GB"/>
           </a:p>
@@ -3685,7 +3685,7 @@
           <a:p>
             <a:fld id="{37870B73-9E6A-498D-A14E-F5F68750FD14}" type="datetimeFigureOut">
               <a:rPr lang="en-GB" smtClean="0"/>
-              <a:t>16/02/2020</a:t>
+              <a:t>31/03/2020</a:t>
             </a:fld>
             <a:endParaRPr lang="en-GB"/>
           </a:p>
@@ -3974,7 +3974,7 @@
           <a:p>
             <a:fld id="{37870B73-9E6A-498D-A14E-F5F68750FD14}" type="datetimeFigureOut">
               <a:rPr lang="en-GB" smtClean="0"/>
-              <a:t>16/02/2020</a:t>
+              <a:t>31/03/2020</a:t>
             </a:fld>
             <a:endParaRPr lang="en-GB"/>
           </a:p>
@@ -4217,7 +4217,7 @@
           <a:p>
             <a:fld id="{37870B73-9E6A-498D-A14E-F5F68750FD14}" type="datetimeFigureOut">
               <a:rPr lang="en-GB" smtClean="0"/>
-              <a:t>16/02/2020</a:t>
+              <a:t>31/03/2020</a:t>
             </a:fld>
             <a:endParaRPr lang="en-GB"/>
           </a:p>
@@ -5467,8 +5467,8 @@
         </p:nvSpPr>
         <p:spPr>
           <a:xfrm>
-            <a:off x="889917" y="2916356"/>
-            <a:ext cx="2007602" cy="923330"/>
+            <a:off x="845033" y="2916356"/>
+            <a:ext cx="2097370" cy="923330"/>
           </a:xfrm>
           <a:prstGeom prst="rect">
             <a:avLst/>
@@ -5491,8 +5491,17 @@
             <a:pPr algn="ctr"/>
             <a:r>
               <a:rPr lang="en-GB" b="1" dirty="0"/>
-              <a:t>spectral-wave-data</a:t>
+              <a:t>s</a:t>
             </a:r>
+            <a:r>
+              <a:rPr lang="en-GB" b="1"/>
+              <a:t>pectral</a:t>
+            </a:r>
+            <a:r>
+              <a:rPr lang="en-GB" b="1" dirty="0" err="1"/>
+              <a:t>_wave_data</a:t>
+            </a:r>
+            <a:endParaRPr lang="en-GB" b="1" dirty="0"/>
           </a:p>
           <a:p>
             <a:pPr algn="ctr"/>
@@ -9668,8 +9677,8 @@
         </p:nvSpPr>
         <p:spPr>
           <a:xfrm>
-            <a:off x="889917" y="2916356"/>
-            <a:ext cx="2007602" cy="923330"/>
+            <a:off x="845033" y="2916356"/>
+            <a:ext cx="2097370" cy="923330"/>
           </a:xfrm>
           <a:prstGeom prst="rect">
             <a:avLst/>
@@ -9691,9 +9700,10 @@
           <a:p>
             <a:pPr algn="ctr"/>
             <a:r>
-              <a:rPr lang="en-GB" b="1" dirty="0"/>
-              <a:t>spectral-wave-data</a:t>
+              <a:rPr lang="en-GB" b="1" dirty="0" err="1"/>
+              <a:t>spectral_wave_data</a:t>
             </a:r>
+            <a:endParaRPr lang="en-GB" b="1" dirty="0"/>
           </a:p>
           <a:p>
             <a:pPr algn="ctr"/>

</xml_diff>